<commit_message>
update report/generating pictures of abstract executions and histories
</commit_message>
<xml_diff>
--- a/alloy/report/pictures of histories.pptx
+++ b/alloy/report/pictures of histories.pptx
@@ -11082,7 +11082,7 @@
             <p:spPr>
               <a:xfrm>
                 <a:off x="583952" y="1418575"/>
-                <a:ext cx="8560048" cy="4555093"/>
+                <a:ext cx="8560048" cy="3631763"/>
               </a:xfrm>
               <a:prstGeom prst="rect">
                 <a:avLst/>
@@ -11172,7 +11172,7 @@
                             <a:latin typeface="Cambria Math" panose="02040503050406030204" pitchFamily="18" charset="0"/>
                             <a:cs typeface="Arial" panose="020B0604020202020204" pitchFamily="34" charset="0"/>
                           </a:rPr>
-                          <m:t>𝑝</m:t>
+                          <m:t>𝑠</m:t>
                         </m:r>
                       </m:e>
                       <m:sub>
@@ -11195,7 +11195,7 @@
                     <m:sSub>
                       <m:sSubPr>
                         <m:ctrlPr>
-                          <a:rPr lang="en-US" altLang="zh-CN" sz="2000" i="1">
+                          <a:rPr lang="en-US" altLang="zh-CN" sz="2000" b="0" i="1" smtClean="0">
                             <a:latin typeface="Cambria Math" panose="02040503050406030204" pitchFamily="18" charset="0"/>
                             <a:cs typeface="Arial" panose="020B0604020202020204" pitchFamily="34" charset="0"/>
                           </a:rPr>
@@ -11207,14 +11207,7 @@
                             <a:latin typeface="Cambria Math" panose="02040503050406030204" pitchFamily="18" charset="0"/>
                             <a:cs typeface="Arial" panose="020B0604020202020204" pitchFamily="34" charset="0"/>
                           </a:rPr>
-                          <m:t>  </m:t>
-                        </m:r>
-                        <m:r>
-                          <a:rPr lang="en-US" altLang="zh-CN" sz="2000" i="1">
-                            <a:latin typeface="Cambria Math" panose="02040503050406030204" pitchFamily="18" charset="0"/>
-                            <a:cs typeface="Arial" panose="020B0604020202020204" pitchFamily="34" charset="0"/>
-                          </a:rPr>
-                          <m:t>𝑝</m:t>
+                          <m:t>𝑠</m:t>
                         </m:r>
                       </m:e>
                       <m:sub>
@@ -11338,7 +11331,24 @@
                     <a:latin typeface="Arial" panose="020B0604020202020204" pitchFamily="34" charset="0"/>
                     <a:cs typeface="Arial" panose="020B0604020202020204" pitchFamily="34" charset="0"/>
                   </a:rPr>
-                  <a:t> of reads (</a:t>
+                  <a:t> of </a:t>
+                </a:r>
+                <a:r>
+                  <a:rPr lang="en-US" altLang="zh-CN" sz="2000" dirty="0">
+                    <a:solidFill>
+                      <a:srgbClr val="FF0000"/>
+                    </a:solidFill>
+                    <a:latin typeface="Arial" panose="020B0604020202020204" pitchFamily="34" charset="0"/>
+                    <a:cs typeface="Arial" panose="020B0604020202020204" pitchFamily="34" charset="0"/>
+                  </a:rPr>
+                  <a:t>reads</a:t>
+                </a:r>
+                <a:r>
+                  <a:rPr lang="en-US" altLang="zh-CN" sz="2000" dirty="0">
+                    <a:latin typeface="Arial" panose="020B0604020202020204" pitchFamily="34" charset="0"/>
+                    <a:cs typeface="Arial" panose="020B0604020202020204" pitchFamily="34" charset="0"/>
+                  </a:rPr>
+                  <a:t> (</a:t>
                 </a:r>
                 <a14:m>
                   <m:oMath xmlns:m="http://schemas.openxmlformats.org/officeDocument/2006/math">
@@ -11432,40 +11442,6 @@
                 </a:r>
               </a:p>
               <a:p>
-                <a:pPr marL="1257300" lvl="2" indent="-342900">
-                  <a:buClr>
-                    <a:srgbClr val="7030A0"/>
-                  </a:buClr>
-                  <a:buSzPct val="80000"/>
-                  <a:buFont typeface="Wingdings" panose="05000000000000000000" pitchFamily="2" charset="2"/>
-                  <a:buChar char="l"/>
-                </a:pPr>
-                <a:r>
-                  <a:rPr lang="en-US" altLang="zh-CN" dirty="0">
-                    <a:latin typeface="Arial" panose="020B0604020202020204" pitchFamily="34" charset="0"/>
-                    <a:cs typeface="Arial" panose="020B0604020202020204" pitchFamily="34" charset="0"/>
-                  </a:rPr>
-                  <a:t>events on the same session</a:t>
-                </a:r>
-              </a:p>
-              <a:p>
-                <a:pPr marL="1257300" lvl="2" indent="-342900">
-                  <a:buClr>
-                    <a:srgbClr val="7030A0"/>
-                  </a:buClr>
-                  <a:buSzPct val="80000"/>
-                  <a:buFont typeface="Wingdings" panose="05000000000000000000" pitchFamily="2" charset="2"/>
-                  <a:buChar char="l"/>
-                </a:pPr>
-                <a:r>
-                  <a:rPr lang="en-US" altLang="zh-CN" dirty="0">
-                    <a:latin typeface="Arial" panose="020B0604020202020204" pitchFamily="34" charset="0"/>
-                    <a:cs typeface="Arial" panose="020B0604020202020204" pitchFamily="34" charset="0"/>
-                  </a:rPr>
-                  <a:t>events on different sessions: only from reads to writes</a:t>
-                </a:r>
-              </a:p>
-              <a:p>
                 <a:pPr marL="800100" lvl="1" indent="-342900">
                   <a:buClr>
                     <a:srgbClr val="7030A0"/>
@@ -11486,24 +11462,7 @@
                     <a:latin typeface="Arial" panose="020B0604020202020204" pitchFamily="34" charset="0"/>
                     <a:cs typeface="Arial" panose="020B0604020202020204" pitchFamily="34" charset="0"/>
                   </a:rPr>
-                  <a:t>: dashed line with arrows </a:t>
-                </a:r>
-              </a:p>
-              <a:p>
-                <a:pPr marL="1257300" lvl="2" indent="-342900">
-                  <a:buClr>
-                    <a:srgbClr val="7030A0"/>
-                  </a:buClr>
-                  <a:buSzPct val="80000"/>
-                  <a:buFont typeface="Wingdings" panose="05000000000000000000" pitchFamily="2" charset="2"/>
-                  <a:buChar char="l"/>
-                </a:pPr>
-                <a:r>
-                  <a:rPr lang="en-US" altLang="zh-CN" sz="2000" dirty="0">
-                    <a:latin typeface="Arial" panose="020B0604020202020204" pitchFamily="34" charset="0"/>
-                    <a:cs typeface="Arial" panose="020B0604020202020204" pitchFamily="34" charset="0"/>
-                  </a:rPr>
-                  <a:t>only over writes</a:t>
+                  <a:t>: dashed line with arrows</a:t>
                 </a:r>
               </a:p>
             </p:txBody>
@@ -11527,7 +11486,7 @@
             <p:spPr>
               <a:xfrm>
                 <a:off x="583952" y="1418575"/>
-                <a:ext cx="8560048" cy="4555093"/>
+                <a:ext cx="8560048" cy="3631763"/>
               </a:xfrm>
               <a:prstGeom prst="rect">
                 <a:avLst/>
@@ -11535,7 +11494,7 @@
               <a:blipFill>
                 <a:blip r:embed="rId2"/>
                 <a:stretch>
-                  <a:fillRect l="-1140" t="-937" b="-268"/>
+                  <a:fillRect l="-1140" t="-1176" b="-2353"/>
                 </a:stretch>
               </a:blipFill>
             </p:spPr>
@@ -11716,7 +11675,7 @@
         </p:nvSpPr>
         <p:spPr>
           <a:xfrm>
-            <a:off x="583952" y="5870579"/>
+            <a:off x="583952" y="5229200"/>
             <a:ext cx="8928992" cy="461665"/>
           </a:xfrm>
           <a:prstGeom prst="rect">
@@ -11743,6 +11702,67 @@
               </a:rPr>
               <a:t>Histories includes session ids and events and so relation</a:t>
             </a:r>
+          </a:p>
+        </p:txBody>
+      </p:sp>
+      <p:sp>
+        <p:nvSpPr>
+          <p:cNvPr id="3" name="文本框 2">
+            <a:extLst>
+              <a:ext uri="{FF2B5EF4-FFF2-40B4-BE49-F238E27FC236}">
+                <a16:creationId xmlns:a16="http://schemas.microsoft.com/office/drawing/2014/main" id="{1753872A-6156-501F-5A78-720F6690D7B6}"/>
+              </a:ext>
+            </a:extLst>
+          </p:cNvPr>
+          <p:cNvSpPr txBox="1"/>
+          <p:nvPr/>
+        </p:nvSpPr>
+        <p:spPr>
+          <a:xfrm>
+            <a:off x="4907777" y="4194068"/>
+            <a:ext cx="2523976" cy="646331"/>
+          </a:xfrm>
+          <a:prstGeom prst="rect">
+            <a:avLst/>
+          </a:prstGeom>
+          <a:noFill/>
+          <a:ln>
+            <a:solidFill>
+              <a:srgbClr val="C00000"/>
+            </a:solidFill>
+          </a:ln>
+        </p:spPr>
+        <p:txBody>
+          <a:bodyPr wrap="square" rtlCol="0">
+            <a:spAutoFit/>
+          </a:bodyPr>
+          <a:lstStyle/>
+          <a:p>
+            <a:r>
+              <a:rPr lang="en-US" altLang="zh-CN" dirty="0">
+                <a:latin typeface="Arial" panose="020B0604020202020204" pitchFamily="34" charset="0"/>
+                <a:cs typeface="Arial" panose="020B0604020202020204" pitchFamily="34" charset="0"/>
+              </a:rPr>
+              <a:t>Removing redundant  vis and </a:t>
+            </a:r>
+            <a:r>
+              <a:rPr lang="en-US" altLang="zh-CN" dirty="0" err="1">
+                <a:latin typeface="Arial" panose="020B0604020202020204" pitchFamily="34" charset="0"/>
+                <a:cs typeface="Arial" panose="020B0604020202020204" pitchFamily="34" charset="0"/>
+              </a:rPr>
+              <a:t>ar</a:t>
+            </a:r>
+            <a:r>
+              <a:rPr lang="en-US" altLang="zh-CN" dirty="0">
+                <a:latin typeface="Arial" panose="020B0604020202020204" pitchFamily="34" charset="0"/>
+                <a:cs typeface="Arial" panose="020B0604020202020204" pitchFamily="34" charset="0"/>
+              </a:rPr>
+              <a:t> relations</a:t>
+            </a:r>
+            <a:endParaRPr lang="zh-CN" altLang="en-US" dirty="0">
+              <a:latin typeface="Arial" panose="020B0604020202020204" pitchFamily="34" charset="0"/>
+              <a:cs typeface="Arial" panose="020B0604020202020204" pitchFamily="34" charset="0"/>
+            </a:endParaRPr>
           </a:p>
         </p:txBody>
       </p:sp>
@@ -12124,7 +12144,7 @@
                           <a:rPr lang="en-US" altLang="zh-CN" b="0" i="1" dirty="0" smtClean="0">
                             <a:latin typeface="Cambria Math" panose="02040503050406030204" pitchFamily="18" charset="0"/>
                           </a:rPr>
-                          <m:t>𝑆</m:t>
+                          <m:t>𝑠</m:t>
                         </m:r>
                       </m:e>
                       <m:sub>
@@ -12173,7 +12193,7 @@
               <a:blipFill>
                 <a:blip r:embed="rId4"/>
                 <a:stretch>
-                  <a:fillRect t="-9836" r="-5319" b="-24590"/>
+                  <a:fillRect t="-9836" r="-3191" b="-24590"/>
                 </a:stretch>
               </a:blipFill>
             </p:spPr>
@@ -12243,7 +12263,7 @@
                           <a:rPr lang="en-US" altLang="zh-CN" b="0" i="1" dirty="0" smtClean="0">
                             <a:latin typeface="Cambria Math" panose="02040503050406030204" pitchFamily="18" charset="0"/>
                           </a:rPr>
-                          <m:t>𝑆</m:t>
+                          <m:t>𝑠</m:t>
                         </m:r>
                       </m:e>
                       <m:sub>
@@ -12292,7 +12312,7 @@
               <a:blipFill>
                 <a:blip r:embed="rId5"/>
                 <a:stretch>
-                  <a:fillRect t="-8197" r="-6316" b="-24590"/>
+                  <a:fillRect t="-8197" r="-4211" b="-24590"/>
                 </a:stretch>
               </a:blipFill>
             </p:spPr>
@@ -12397,7 +12417,7 @@
                           <a:rPr lang="en-US" altLang="zh-CN" b="0" i="1" dirty="0" smtClean="0">
                             <a:latin typeface="Cambria Math" panose="02040503050406030204" pitchFamily="18" charset="0"/>
                           </a:rPr>
-                          <m:t>𝑆</m:t>
+                          <m:t>𝑠</m:t>
                         </m:r>
                       </m:e>
                       <m:sub>
@@ -12446,7 +12466,7 @@
               <a:blipFill>
                 <a:blip r:embed="rId7"/>
                 <a:stretch>
-                  <a:fillRect t="-10000" r="-5263" b="-26667"/>
+                  <a:fillRect t="-10000" r="-3158" b="-26667"/>
                 </a:stretch>
               </a:blipFill>
             </p:spPr>
@@ -12516,7 +12536,7 @@
                           <a:rPr lang="en-US" altLang="zh-CN" b="0" i="1" dirty="0" smtClean="0">
                             <a:latin typeface="Cambria Math" panose="02040503050406030204" pitchFamily="18" charset="0"/>
                           </a:rPr>
-                          <m:t>𝑆</m:t>
+                          <m:t>𝑠</m:t>
                         </m:r>
                       </m:e>
                       <m:sub>
@@ -12565,7 +12585,7 @@
               <a:blipFill>
                 <a:blip r:embed="rId8"/>
                 <a:stretch>
-                  <a:fillRect t="-8197" r="-6316" b="-24590"/>
+                  <a:fillRect t="-8197" r="-4211" b="-24590"/>
                 </a:stretch>
               </a:blipFill>
             </p:spPr>
@@ -12923,8 +12943,8 @@
           <a:chExt cx="0" cy="0"/>
         </a:xfrm>
       </p:grpSpPr>
-      <mc:AlternateContent xmlns:mc="http://schemas.openxmlformats.org/markup-compatibility/2006">
-        <mc:Choice xmlns:a14="http://schemas.microsoft.com/office/drawing/2010/main" Requires="a14">
+      <mc:AlternateContent xmlns:mc="http://schemas.openxmlformats.org/markup-compatibility/2006" xmlns:a14="http://schemas.microsoft.com/office/drawing/2010/main">
+        <mc:Choice Requires="a14">
           <p:sp>
             <p:nvSpPr>
               <p:cNvPr id="9" name="文本框 8">
@@ -13194,7 +13214,7 @@
             </p:txBody>
           </p:sp>
         </mc:Choice>
-        <mc:Fallback>
+        <mc:Fallback xmlns="">
           <p:sp>
             <p:nvSpPr>
               <p:cNvPr id="9" name="文本框 8">
@@ -13490,7 +13510,7 @@
                           <a:rPr lang="en-US" altLang="zh-CN" b="0" i="1" dirty="0" smtClean="0">
                             <a:latin typeface="Cambria Math" panose="02040503050406030204" pitchFamily="18" charset="0"/>
                           </a:rPr>
-                          <m:t>𝑆</m:t>
+                          <m:t>𝑠</m:t>
                         </m:r>
                       </m:e>
                       <m:sub>
@@ -13614,8 +13634,8 @@
             <a:chExt cx="2123728" cy="550992"/>
           </a:xfrm>
         </p:grpSpPr>
-        <mc:AlternateContent xmlns:mc="http://schemas.openxmlformats.org/markup-compatibility/2006">
-          <mc:Choice xmlns:a14="http://schemas.microsoft.com/office/drawing/2010/main" Requires="a14">
+        <mc:AlternateContent xmlns:mc="http://schemas.openxmlformats.org/markup-compatibility/2006" xmlns:a14="http://schemas.microsoft.com/office/drawing/2010/main">
+          <mc:Choice Requires="a14">
             <p:sp>
               <p:nvSpPr>
                 <p:cNvPr id="7" name="矩形 6">
@@ -13815,7 +13835,7 @@
               </p:txBody>
             </p:sp>
           </mc:Choice>
-          <mc:Fallback>
+          <mc:Fallback xmlns="">
             <p:sp>
               <p:nvSpPr>
                 <p:cNvPr id="7" name="矩形 6">
@@ -13943,8 +13963,8 @@
           </p:txBody>
         </p:sp>
       </p:grpSp>
-      <mc:AlternateContent xmlns:mc="http://schemas.openxmlformats.org/markup-compatibility/2006">
-        <mc:Choice xmlns:a14="http://schemas.microsoft.com/office/drawing/2010/main" Requires="a14">
+      <mc:AlternateContent xmlns:mc="http://schemas.openxmlformats.org/markup-compatibility/2006" xmlns:a14="http://schemas.microsoft.com/office/drawing/2010/main">
+        <mc:Choice Requires="a14">
           <p:sp>
             <p:nvSpPr>
               <p:cNvPr id="17" name="文本框 16">
@@ -13973,6 +13993,7 @@
               </a:bodyPr>
               <a:lstStyle/>
               <a:p>
+                <a:pPr/>
                 <a14:m>
                   <m:oMathPara xmlns:m="http://schemas.openxmlformats.org/officeDocument/2006/math">
                     <m:oMathParaPr>
@@ -14012,7 +14033,7 @@
             </p:txBody>
           </p:sp>
         </mc:Choice>
-        <mc:Fallback>
+        <mc:Fallback xmlns="">
           <p:sp>
             <p:nvSpPr>
               <p:cNvPr id="17" name="文本框 16">
@@ -14077,8 +14098,8 @@
             <a:chExt cx="2123728" cy="550992"/>
           </a:xfrm>
         </p:grpSpPr>
-        <mc:AlternateContent xmlns:mc="http://schemas.openxmlformats.org/markup-compatibility/2006">
-          <mc:Choice xmlns:a14="http://schemas.microsoft.com/office/drawing/2010/main" Requires="a14">
+        <mc:AlternateContent xmlns:mc="http://schemas.openxmlformats.org/markup-compatibility/2006" xmlns:a14="http://schemas.microsoft.com/office/drawing/2010/main">
+          <mc:Choice Requires="a14">
             <p:sp>
               <p:nvSpPr>
                 <p:cNvPr id="19" name="矩形 18">
@@ -14278,7 +14299,7 @@
               </p:txBody>
             </p:sp>
           </mc:Choice>
-          <mc:Fallback>
+          <mc:Fallback xmlns="">
             <p:sp>
               <p:nvSpPr>
                 <p:cNvPr id="19" name="矩形 18">
@@ -14426,8 +14447,8 @@
             <a:chExt cx="2266169" cy="606406"/>
           </a:xfrm>
         </p:grpSpPr>
-        <mc:AlternateContent xmlns:mc="http://schemas.openxmlformats.org/markup-compatibility/2006">
-          <mc:Choice xmlns:a14="http://schemas.microsoft.com/office/drawing/2010/main" Requires="a14">
+        <mc:AlternateContent xmlns:mc="http://schemas.openxmlformats.org/markup-compatibility/2006" xmlns:a14="http://schemas.microsoft.com/office/drawing/2010/main">
+          <mc:Choice Requires="a14">
             <p:sp>
               <p:nvSpPr>
                 <p:cNvPr id="23" name="矩形 22">
@@ -14627,7 +14648,7 @@
               </p:txBody>
             </p:sp>
           </mc:Choice>
-          <mc:Fallback>
+          <mc:Fallback xmlns="">
             <p:sp>
               <p:nvSpPr>
                 <p:cNvPr id="23" name="矩形 22">
@@ -14800,7 +14821,7 @@
                           <a:rPr lang="en-US" altLang="zh-CN" b="0" i="1" dirty="0" smtClean="0">
                             <a:latin typeface="Cambria Math" panose="02040503050406030204" pitchFamily="18" charset="0"/>
                           </a:rPr>
-                          <m:t>𝑆</m:t>
+                          <m:t>𝑠</m:t>
                         </m:r>
                       </m:e>
                       <m:sub>
@@ -14868,8 +14889,8 @@
           </p:sp>
         </mc:Fallback>
       </mc:AlternateContent>
-      <mc:AlternateContent xmlns:mc="http://schemas.openxmlformats.org/markup-compatibility/2006">
-        <mc:Choice xmlns:a14="http://schemas.microsoft.com/office/drawing/2010/main" Requires="a14">
+      <mc:AlternateContent xmlns:mc="http://schemas.openxmlformats.org/markup-compatibility/2006" xmlns:a14="http://schemas.microsoft.com/office/drawing/2010/main">
+        <mc:Choice Requires="a14">
           <p:sp>
             <p:nvSpPr>
               <p:cNvPr id="27" name="文本框 26">
@@ -14898,6 +14919,7 @@
               </a:bodyPr>
               <a:lstStyle/>
               <a:p>
+                <a:pPr/>
                 <a14:m>
                   <m:oMathPara xmlns:m="http://schemas.openxmlformats.org/officeDocument/2006/math">
                     <m:oMathParaPr>
@@ -14937,7 +14959,7 @@
             </p:txBody>
           </p:sp>
         </mc:Choice>
-        <mc:Fallback>
+        <mc:Fallback xmlns="">
           <p:sp>
             <p:nvSpPr>
               <p:cNvPr id="27" name="文本框 26">
@@ -14982,8 +15004,8 @@
           </p:sp>
         </mc:Fallback>
       </mc:AlternateContent>
-      <mc:AlternateContent xmlns:mc="http://schemas.openxmlformats.org/markup-compatibility/2006">
-        <mc:Choice xmlns:a14="http://schemas.microsoft.com/office/drawing/2010/main" Requires="a14">
+      <mc:AlternateContent xmlns:mc="http://schemas.openxmlformats.org/markup-compatibility/2006" xmlns:a14="http://schemas.microsoft.com/office/drawing/2010/main">
+        <mc:Choice Requires="a14">
           <p:sp>
             <p:nvSpPr>
               <p:cNvPr id="28" name="文本框 27">
@@ -15012,6 +15034,7 @@
               </a:bodyPr>
               <a:lstStyle/>
               <a:p>
+                <a:pPr/>
                 <a14:m>
                   <m:oMathPara xmlns:m="http://schemas.openxmlformats.org/officeDocument/2006/math">
                     <m:oMathParaPr>
@@ -15051,7 +15074,7 @@
             </p:txBody>
           </p:sp>
         </mc:Choice>
-        <mc:Fallback>
+        <mc:Fallback xmlns="">
           <p:sp>
             <p:nvSpPr>
               <p:cNvPr id="28" name="文本框 27">

</xml_diff>